<commit_message>
Update PPT Second Time
</commit_message>
<xml_diff>
--- a/DaseBigDataLab.pptx
+++ b/DaseBigDataLab.pptx
@@ -6,10 +6,10 @@
     <p:sldMasterId id="2147483659" r:id="rId2"/>
   </p:sldMasterIdLst>
   <p:notesMasterIdLst>
-    <p:notesMasterId r:id="rId20"/>
+    <p:notesMasterId r:id="rId21"/>
   </p:notesMasterIdLst>
   <p:handoutMasterIdLst>
-    <p:handoutMasterId r:id="rId21"/>
+    <p:handoutMasterId r:id="rId22"/>
   </p:handoutMasterIdLst>
   <p:sldIdLst>
     <p:sldId id="257" r:id="rId3"/>
@@ -27,13 +27,14 @@
     <p:sldId id="310" r:id="rId15"/>
     <p:sldId id="311" r:id="rId16"/>
     <p:sldId id="272" r:id="rId17"/>
-    <p:sldId id="312" r:id="rId18"/>
-    <p:sldId id="279" r:id="rId19"/>
+    <p:sldId id="315" r:id="rId18"/>
+    <p:sldId id="312" r:id="rId19"/>
+    <p:sldId id="279" r:id="rId20"/>
   </p:sldIdLst>
   <p:sldSz cx="12192000" cy="6858000"/>
   <p:notesSz cx="7104063" cy="10234613"/>
   <p:custDataLst>
-    <p:tags r:id="rId22"/>
+    <p:tags r:id="rId23"/>
   </p:custDataLst>
   <p:defaultTextStyle>
     <a:defPPr>
@@ -836,6 +837,114 @@
         <p:cNvPr id="1" name="">
           <a:extLst>
             <a:ext uri="{FF2B5EF4-FFF2-40B4-BE49-F238E27FC236}">
+              <a16:creationId xmlns:a16="http://schemas.microsoft.com/office/drawing/2014/main" id="{C3A6A898-0B80-C63F-7454-176BC107D06A}"/>
+            </a:ext>
+          </a:extLst>
+        </p:cNvPr>
+        <p:cNvGrpSpPr/>
+        <p:nvPr/>
+      </p:nvGrpSpPr>
+      <p:grpSpPr>
+        <a:xfrm>
+          <a:off x="0" y="0"/>
+          <a:ext cx="0" cy="0"/>
+          <a:chOff x="0" y="0"/>
+          <a:chExt cx="0" cy="0"/>
+        </a:xfrm>
+      </p:grpSpPr>
+      <p:sp>
+        <p:nvSpPr>
+          <p:cNvPr id="2" name="幻灯片图像占位符 1">
+            <a:extLst>
+              <a:ext uri="{FF2B5EF4-FFF2-40B4-BE49-F238E27FC236}">
+                <a16:creationId xmlns:a16="http://schemas.microsoft.com/office/drawing/2014/main" id="{AB971ED9-1BA2-6DE2-900A-174A34EA1373}"/>
+              </a:ext>
+            </a:extLst>
+          </p:cNvPr>
+          <p:cNvSpPr>
+            <a:spLocks noGrp="1" noRot="1" noChangeAspect="1"/>
+          </p:cNvSpPr>
+          <p:nvPr>
+            <p:ph type="sldImg"/>
+          </p:nvPr>
+        </p:nvSpPr>
+        <p:spPr/>
+      </p:sp>
+      <p:sp>
+        <p:nvSpPr>
+          <p:cNvPr id="3" name="备注占位符 2">
+            <a:extLst>
+              <a:ext uri="{FF2B5EF4-FFF2-40B4-BE49-F238E27FC236}">
+                <a16:creationId xmlns:a16="http://schemas.microsoft.com/office/drawing/2014/main" id="{DEFEB62C-D5C1-B959-6F6F-BA7F6489C489}"/>
+              </a:ext>
+            </a:extLst>
+          </p:cNvPr>
+          <p:cNvSpPr>
+            <a:spLocks noGrp="1"/>
+          </p:cNvSpPr>
+          <p:nvPr>
+            <p:ph type="body" idx="1"/>
+          </p:nvPr>
+        </p:nvSpPr>
+        <p:spPr/>
+        <p:txBody>
+          <a:bodyPr/>
+          <a:lstStyle/>
+          <a:p>
+            <a:endParaRPr kumimoji="1" lang="zh-CN" altLang="en-US" dirty="0"/>
+          </a:p>
+        </p:txBody>
+      </p:sp>
+      <p:sp>
+        <p:nvSpPr>
+          <p:cNvPr id="4" name="灯片编号占位符 3">
+            <a:extLst>
+              <a:ext uri="{FF2B5EF4-FFF2-40B4-BE49-F238E27FC236}">
+                <a16:creationId xmlns:a16="http://schemas.microsoft.com/office/drawing/2014/main" id="{83503EC5-BF80-C48F-769D-677DFF88F2AB}"/>
+              </a:ext>
+            </a:extLst>
+          </p:cNvPr>
+          <p:cNvSpPr>
+            <a:spLocks noGrp="1"/>
+          </p:cNvSpPr>
+          <p:nvPr>
+            <p:ph type="sldNum" sz="quarter" idx="5"/>
+          </p:nvPr>
+        </p:nvSpPr>
+        <p:spPr/>
+        <p:txBody>
+          <a:bodyPr/>
+          <a:lstStyle/>
+          <a:p>
+            <a:fld id="{85D0DACE-38E0-42D2-9336-2B707D34BC6D}" type="slidenum">
+              <a:rPr lang="zh-CN" altLang="en-US" smtClean="0"/>
+              <a:t>16</a:t>
+            </a:fld>
+            <a:endParaRPr lang="zh-CN" altLang="en-US"/>
+          </a:p>
+        </p:txBody>
+      </p:sp>
+    </p:spTree>
+    <p:extLst>
+      <p:ext uri="{BB962C8B-B14F-4D97-AF65-F5344CB8AC3E}">
+        <p14:creationId xmlns:p14="http://schemas.microsoft.com/office/powerpoint/2010/main" val="670544331"/>
+      </p:ext>
+    </p:extLst>
+  </p:cSld>
+  <p:clrMapOvr>
+    <a:masterClrMapping/>
+  </p:clrMapOvr>
+</p:notes>
+</file>
+
+<file path=ppt/notesSlides/notesSlide12.xml><?xml version="1.0" encoding="utf-8"?>
+<p:notes xmlns:a="http://schemas.openxmlformats.org/drawingml/2006/main" xmlns:r="http://schemas.openxmlformats.org/officeDocument/2006/relationships" xmlns:p="http://schemas.openxmlformats.org/presentationml/2006/main">
+  <p:cSld>
+    <p:spTree>
+      <p:nvGrpSpPr>
+        <p:cNvPr id="1" name="">
+          <a:extLst>
+            <a:ext uri="{FF2B5EF4-FFF2-40B4-BE49-F238E27FC236}">
               <a16:creationId xmlns:a16="http://schemas.microsoft.com/office/drawing/2014/main" id="{88C66DFB-5D5E-CE81-79A0-4E5CAD5AC623}"/>
             </a:ext>
           </a:extLst>
@@ -917,7 +1026,7 @@
           <a:p>
             <a:fld id="{85D0DACE-38E0-42D2-9336-2B707D34BC6D}" type="slidenum">
               <a:rPr lang="zh-CN" altLang="en-US" smtClean="0"/>
-              <a:t>16</a:t>
+              <a:t>17</a:t>
             </a:fld>
             <a:endParaRPr lang="zh-CN" altLang="en-US"/>
           </a:p>
@@ -12474,6 +12583,734 @@
         <p:cNvPr id="1" name="">
           <a:extLst>
             <a:ext uri="{FF2B5EF4-FFF2-40B4-BE49-F238E27FC236}">
+              <a16:creationId xmlns:a16="http://schemas.microsoft.com/office/drawing/2014/main" id="{C7C1C0D6-02D3-6456-1016-19B52115AE97}"/>
+            </a:ext>
+          </a:extLst>
+        </p:cNvPr>
+        <p:cNvGrpSpPr/>
+        <p:nvPr/>
+      </p:nvGrpSpPr>
+      <p:grpSpPr>
+        <a:xfrm>
+          <a:off x="0" y="0"/>
+          <a:ext cx="0" cy="0"/>
+          <a:chOff x="0" y="0"/>
+          <a:chExt cx="0" cy="0"/>
+        </a:xfrm>
+      </p:grpSpPr>
+      <p:sp>
+        <p:nvSpPr>
+          <p:cNvPr id="2" name="标题 1">
+            <a:extLst>
+              <a:ext uri="{FF2B5EF4-FFF2-40B4-BE49-F238E27FC236}">
+                <a16:creationId xmlns:a16="http://schemas.microsoft.com/office/drawing/2014/main" id="{5528070B-0561-BB16-72B3-ABE7F8E14DF2}"/>
+              </a:ext>
+            </a:extLst>
+          </p:cNvPr>
+          <p:cNvSpPr>
+            <a:spLocks noGrp="1"/>
+          </p:cNvSpPr>
+          <p:nvPr>
+            <p:ph type="title"/>
+          </p:nvPr>
+        </p:nvSpPr>
+        <p:spPr>
+          <a:xfrm>
+            <a:off x="946971" y="377929"/>
+            <a:ext cx="10800000" cy="720000"/>
+          </a:xfrm>
+        </p:spPr>
+        <p:txBody>
+          <a:bodyPr>
+            <a:normAutofit/>
+          </a:bodyPr>
+          <a:lstStyle/>
+          <a:p>
+            <a:r>
+              <a:rPr lang="zh-CN" altLang="en-US" dirty="0"/>
+              <a:t>性能差异分析</a:t>
+            </a:r>
+          </a:p>
+        </p:txBody>
+      </p:sp>
+      <p:sp>
+        <p:nvSpPr>
+          <p:cNvPr id="7" name="文本框 6">
+            <a:extLst>
+              <a:ext uri="{FF2B5EF4-FFF2-40B4-BE49-F238E27FC236}">
+                <a16:creationId xmlns:a16="http://schemas.microsoft.com/office/drawing/2014/main" id="{9A324508-5CA5-80CC-7648-8C3B6B2A6E0C}"/>
+              </a:ext>
+            </a:extLst>
+          </p:cNvPr>
+          <p:cNvSpPr txBox="1"/>
+          <p:nvPr/>
+        </p:nvSpPr>
+        <p:spPr>
+          <a:xfrm>
+            <a:off x="942372" y="1205254"/>
+            <a:ext cx="10307256" cy="5219506"/>
+          </a:xfrm>
+          <a:prstGeom prst="rect">
+            <a:avLst/>
+          </a:prstGeom>
+          <a:noFill/>
+        </p:spPr>
+        <p:txBody>
+          <a:bodyPr wrap="square">
+            <a:spAutoFit/>
+          </a:bodyPr>
+          <a:lstStyle/>
+          <a:p>
+            <a:pPr algn="l">
+              <a:lnSpc>
+                <a:spcPct val="150000"/>
+              </a:lnSpc>
+            </a:pPr>
+            <a:r>
+              <a:rPr lang="zh-CN" altLang="en-US" sz="1600" b="1" i="0" u="none" strike="noStrike" dirty="0">
+                <a:effectLst/>
+                <a:latin typeface="+mn-ea"/>
+              </a:rPr>
+              <a:t>数据流优化方面</a:t>
+            </a:r>
+            <a:r>
+              <a:rPr lang="en-US" altLang="zh-CN" sz="1600" b="1" i="0" u="none" strike="noStrike" dirty="0">
+                <a:effectLst/>
+                <a:latin typeface="+mn-ea"/>
+              </a:rPr>
+              <a:t>:</a:t>
+            </a:r>
+          </a:p>
+          <a:p>
+            <a:pPr algn="l">
+              <a:lnSpc>
+                <a:spcPct val="150000"/>
+              </a:lnSpc>
+            </a:pPr>
+            <a:r>
+              <a:rPr lang="en" altLang="zh-CN" sz="1600" b="0" i="0" u="none" strike="noStrike" dirty="0">
+                <a:effectLst/>
+                <a:latin typeface="+mn-ea"/>
+              </a:rPr>
+              <a:t>Spark</a:t>
+            </a:r>
+            <a:r>
+              <a:rPr lang="zh-CN" altLang="en-US" sz="1600" b="0" i="0" u="none" strike="noStrike" dirty="0">
+                <a:effectLst/>
+                <a:latin typeface="+mn-ea"/>
+              </a:rPr>
+              <a:t>脚本中的操作链 </a:t>
+            </a:r>
+            <a:r>
+              <a:rPr lang="en" altLang="zh-CN" sz="1600" b="0" i="0" u="none" strike="noStrike" dirty="0">
+                <a:effectLst/>
+                <a:latin typeface="+mn-ea"/>
+              </a:rPr>
+              <a:t>read → split → explode → filter → </a:t>
+            </a:r>
+            <a:r>
+              <a:rPr lang="en" altLang="zh-CN" sz="1600" b="0" i="0" u="none" strike="noStrike" dirty="0" err="1">
+                <a:effectLst/>
+                <a:latin typeface="+mn-ea"/>
+              </a:rPr>
+              <a:t>groupBy</a:t>
+            </a:r>
+            <a:r>
+              <a:rPr lang="en" altLang="zh-CN" sz="1600" b="0" i="0" u="none" strike="noStrike" dirty="0">
+                <a:effectLst/>
+                <a:latin typeface="+mn-ea"/>
+              </a:rPr>
+              <a:t> → </a:t>
+            </a:r>
+            <a:r>
+              <a:rPr lang="en" altLang="zh-CN" sz="1600" b="0" i="0" u="none" strike="noStrike" dirty="0" err="1">
+                <a:effectLst/>
+                <a:latin typeface="+mn-ea"/>
+              </a:rPr>
+              <a:t>orderBy</a:t>
+            </a:r>
+            <a:r>
+              <a:rPr lang="en" altLang="zh-CN" sz="1600" b="0" i="0" u="none" strike="noStrike" dirty="0">
+                <a:effectLst/>
+                <a:latin typeface="+mn-ea"/>
+              </a:rPr>
+              <a:t> </a:t>
+            </a:r>
+            <a:r>
+              <a:rPr lang="zh-CN" altLang="en-US" sz="1600" b="0" i="0" u="none" strike="noStrike" dirty="0">
+                <a:effectLst/>
+                <a:latin typeface="+mn-ea"/>
+              </a:rPr>
+              <a:t>会被优化成一个</a:t>
+            </a:r>
+            <a:r>
+              <a:rPr lang="en" altLang="zh-CN" sz="1600" b="0" i="0" u="none" strike="noStrike" dirty="0">
+                <a:effectLst/>
+                <a:latin typeface="+mn-ea"/>
+              </a:rPr>
+              <a:t>DAG</a:t>
+            </a:r>
+            <a:r>
+              <a:rPr lang="zh-CN" altLang="en-US" sz="1600" b="0" i="0" u="none" strike="noStrike" dirty="0">
+                <a:effectLst/>
+                <a:latin typeface="+mn-ea"/>
+              </a:rPr>
+              <a:t>，</a:t>
+            </a:r>
+            <a:r>
+              <a:rPr lang="en" altLang="zh-CN" sz="1600" b="0" i="0" u="none" strike="noStrike" dirty="0">
+                <a:effectLst/>
+                <a:latin typeface="+mn-ea"/>
+              </a:rPr>
+              <a:t>Spark</a:t>
+            </a:r>
+            <a:r>
+              <a:rPr lang="zh-CN" altLang="en-US" sz="1600" b="0" i="0" u="none" strike="noStrike" dirty="0">
+                <a:effectLst/>
+                <a:latin typeface="+mn-ea"/>
+              </a:rPr>
+              <a:t>可以自动进行</a:t>
+            </a:r>
+            <a:r>
+              <a:rPr lang="en" altLang="zh-CN" sz="1600" b="0" i="0" u="none" strike="noStrike" dirty="0">
+                <a:effectLst/>
+                <a:latin typeface="+mn-ea"/>
+              </a:rPr>
+              <a:t>stage</a:t>
+            </a:r>
+            <a:r>
+              <a:rPr lang="zh-CN" altLang="en-US" sz="1600" b="0" i="0" u="none" strike="noStrike" dirty="0">
+                <a:effectLst/>
+                <a:latin typeface="+mn-ea"/>
+              </a:rPr>
+              <a:t>合并和</a:t>
+            </a:r>
+            <a:r>
+              <a:rPr lang="en" altLang="zh-CN" sz="1600" b="0" i="0" u="none" strike="noStrike" dirty="0">
+                <a:effectLst/>
+                <a:latin typeface="+mn-ea"/>
+              </a:rPr>
+              <a:t>pipeline</a:t>
+            </a:r>
+            <a:r>
+              <a:rPr lang="zh-CN" altLang="en-US" sz="1600" b="0" i="0" u="none" strike="noStrike" dirty="0">
+                <a:effectLst/>
+                <a:latin typeface="+mn-ea"/>
+              </a:rPr>
+              <a:t>优化。</a:t>
+            </a:r>
+          </a:p>
+          <a:p>
+            <a:pPr algn="l">
+              <a:lnSpc>
+                <a:spcPct val="150000"/>
+              </a:lnSpc>
+            </a:pPr>
+            <a:r>
+              <a:rPr lang="en" altLang="zh-CN" sz="1600" b="0" i="0" u="none" strike="noStrike" dirty="0">
+                <a:effectLst/>
+                <a:latin typeface="+mn-ea"/>
+              </a:rPr>
+              <a:t>MapReduce</a:t>
+            </a:r>
+            <a:r>
+              <a:rPr lang="zh-CN" altLang="en-US" sz="1600" b="0" i="0" u="none" strike="noStrike" dirty="0">
+                <a:effectLst/>
+                <a:latin typeface="+mn-ea"/>
+              </a:rPr>
+              <a:t>脚本必须严格遵循</a:t>
+            </a:r>
+            <a:r>
+              <a:rPr lang="en" altLang="zh-CN" sz="1600" b="0" i="0" u="none" strike="noStrike" dirty="0">
+                <a:effectLst/>
+                <a:latin typeface="+mn-ea"/>
+              </a:rPr>
+              <a:t>mapper(</a:t>
+            </a:r>
+            <a:r>
+              <a:rPr lang="zh-CN" altLang="en-US" sz="1600" b="0" i="0" u="none" strike="noStrike" dirty="0">
+                <a:effectLst/>
+                <a:latin typeface="+mn-ea"/>
+              </a:rPr>
+              <a:t>分词</a:t>
+            </a:r>
+            <a:r>
+              <a:rPr lang="en-US" altLang="zh-CN" sz="1600" b="0" i="0" u="none" strike="noStrike" dirty="0">
+                <a:effectLst/>
+                <a:latin typeface="+mn-ea"/>
+              </a:rPr>
+              <a:t>) → </a:t>
+            </a:r>
+            <a:r>
+              <a:rPr lang="en" altLang="zh-CN" sz="1600" b="0" i="0" u="none" strike="noStrike" dirty="0">
+                <a:effectLst/>
+                <a:latin typeface="+mn-ea"/>
+              </a:rPr>
+              <a:t>shuffle → reducer(</a:t>
+            </a:r>
+            <a:r>
+              <a:rPr lang="zh-CN" altLang="en-US" sz="1600" b="0" i="0" u="none" strike="noStrike" dirty="0">
+                <a:effectLst/>
+                <a:latin typeface="+mn-ea"/>
+              </a:rPr>
+              <a:t>汇总</a:t>
+            </a:r>
+            <a:r>
+              <a:rPr lang="en-US" altLang="zh-CN" sz="1600" b="0" i="0" u="none" strike="noStrike" dirty="0">
+                <a:effectLst/>
+                <a:latin typeface="+mn-ea"/>
+              </a:rPr>
+              <a:t>)</a:t>
+            </a:r>
+            <a:r>
+              <a:rPr lang="zh-CN" altLang="en-US" sz="1600" b="0" i="0" u="none" strike="noStrike" dirty="0">
+                <a:effectLst/>
+                <a:latin typeface="+mn-ea"/>
+              </a:rPr>
+              <a:t>的模式</a:t>
+            </a:r>
+            <a:r>
+              <a:rPr lang="zh-CN" altLang="en-US" sz="1600" dirty="0">
+                <a:latin typeface="+mn-ea"/>
+              </a:rPr>
+              <a:t>，</a:t>
+            </a:r>
+            <a:r>
+              <a:rPr lang="zh-CN" altLang="en-US" sz="1600" b="0" i="0" u="none" strike="noStrike" dirty="0">
+                <a:effectLst/>
+                <a:latin typeface="+mn-ea"/>
+              </a:rPr>
+              <a:t>中间结果必须写入磁盘。</a:t>
+            </a:r>
+            <a:endParaRPr lang="en-US" altLang="zh-CN" sz="1600" b="0" i="0" u="none" strike="noStrike" dirty="0">
+              <a:effectLst/>
+              <a:latin typeface="+mn-ea"/>
+            </a:endParaRPr>
+          </a:p>
+          <a:p>
+            <a:pPr algn="l">
+              <a:lnSpc>
+                <a:spcPct val="150000"/>
+              </a:lnSpc>
+            </a:pPr>
+            <a:endParaRPr lang="zh-CN" altLang="en-US" sz="1600" b="0" i="0" u="none" strike="noStrike" dirty="0">
+              <a:effectLst/>
+              <a:latin typeface="+mn-ea"/>
+            </a:endParaRPr>
+          </a:p>
+          <a:p>
+            <a:pPr algn="l">
+              <a:lnSpc>
+                <a:spcPct val="150000"/>
+              </a:lnSpc>
+            </a:pPr>
+            <a:r>
+              <a:rPr lang="zh-CN" altLang="en-US" sz="1600" b="1" i="0" u="none" strike="noStrike" dirty="0">
+                <a:effectLst/>
+                <a:latin typeface="+mn-ea"/>
+              </a:rPr>
+              <a:t>存储机制方面</a:t>
+            </a:r>
+            <a:r>
+              <a:rPr lang="en-US" altLang="zh-CN" sz="1600" b="1" i="0" u="none" strike="noStrike" dirty="0">
+                <a:effectLst/>
+                <a:latin typeface="+mn-ea"/>
+              </a:rPr>
+              <a:t>:</a:t>
+            </a:r>
+          </a:p>
+          <a:p>
+            <a:pPr algn="l">
+              <a:lnSpc>
+                <a:spcPct val="150000"/>
+              </a:lnSpc>
+            </a:pPr>
+            <a:r>
+              <a:rPr lang="en" altLang="zh-CN" sz="1600" b="0" i="0" u="none" strike="noStrike" dirty="0">
+                <a:effectLst/>
+                <a:latin typeface="+mn-ea"/>
+              </a:rPr>
+              <a:t>Spark</a:t>
+            </a:r>
+            <a:r>
+              <a:rPr lang="zh-CN" altLang="en-US" sz="1600" b="0" i="0" u="none" strike="noStrike" dirty="0">
+                <a:effectLst/>
+                <a:latin typeface="+mn-ea"/>
+              </a:rPr>
+              <a:t>的</a:t>
+            </a:r>
+            <a:r>
+              <a:rPr lang="en" altLang="zh-CN" sz="1600" b="0" i="0" u="none" strike="noStrike" dirty="0" err="1">
+                <a:effectLst/>
+                <a:latin typeface="+mn-ea"/>
+              </a:rPr>
+              <a:t>DataFrame</a:t>
+            </a:r>
+            <a:r>
+              <a:rPr lang="en" altLang="zh-CN" sz="1600" b="0" i="0" u="none" strike="noStrike" dirty="0">
+                <a:effectLst/>
+                <a:latin typeface="+mn-ea"/>
+              </a:rPr>
+              <a:t> API</a:t>
+            </a:r>
+            <a:r>
+              <a:rPr lang="zh-CN" altLang="en-US" sz="1600" b="0" i="0" u="none" strike="noStrike" dirty="0">
+                <a:effectLst/>
+                <a:latin typeface="+mn-ea"/>
+              </a:rPr>
+              <a:t>和</a:t>
+            </a:r>
+            <a:r>
+              <a:rPr lang="en" altLang="zh-CN" sz="1600" b="0" i="0" u="none" strike="noStrike" dirty="0">
+                <a:effectLst/>
+                <a:latin typeface="+mn-ea"/>
+              </a:rPr>
+              <a:t>RDD</a:t>
+            </a:r>
+            <a:r>
+              <a:rPr lang="zh-CN" altLang="en-US" sz="1600" b="0" i="0" u="none" strike="noStrike" dirty="0">
+                <a:effectLst/>
+                <a:latin typeface="+mn-ea"/>
+              </a:rPr>
+              <a:t>设计允许将中间结果缓存在内存中，而不是写入磁盘。这显著减少了</a:t>
+            </a:r>
+            <a:r>
+              <a:rPr lang="en" altLang="zh-CN" sz="1600" b="0" i="0" u="none" strike="noStrike" dirty="0">
+                <a:effectLst/>
+                <a:latin typeface="+mn-ea"/>
+              </a:rPr>
+              <a:t>I/O</a:t>
+            </a:r>
+            <a:r>
+              <a:rPr lang="zh-CN" altLang="en-US" sz="1600" b="0" i="0" u="none" strike="noStrike" dirty="0">
+                <a:effectLst/>
+                <a:latin typeface="+mn-ea"/>
+              </a:rPr>
+              <a:t>开销，特别是在需要多次访问中间结果的场景（如</a:t>
+            </a:r>
+            <a:r>
+              <a:rPr lang="en" altLang="zh-CN" sz="1600" b="0" i="0" u="none" strike="noStrike" dirty="0" err="1">
+                <a:effectLst/>
+                <a:latin typeface="+mn-ea"/>
+              </a:rPr>
+              <a:t>groupBy</a:t>
+            </a:r>
+            <a:r>
+              <a:rPr lang="zh-CN" altLang="en-US" sz="1600" b="0" i="0" u="none" strike="noStrike" dirty="0">
+                <a:effectLst/>
+                <a:latin typeface="+mn-ea"/>
+              </a:rPr>
+              <a:t>和</a:t>
+            </a:r>
+            <a:r>
+              <a:rPr lang="en" altLang="zh-CN" sz="1600" b="0" i="0" u="none" strike="noStrike" dirty="0" err="1">
+                <a:effectLst/>
+                <a:latin typeface="+mn-ea"/>
+              </a:rPr>
+              <a:t>orderBy</a:t>
+            </a:r>
+            <a:r>
+              <a:rPr lang="zh-CN" altLang="en" sz="1600" b="0" i="0" u="none" strike="noStrike" dirty="0">
+                <a:effectLst/>
+                <a:latin typeface="+mn-ea"/>
+              </a:rPr>
+              <a:t>）。</a:t>
+            </a:r>
+          </a:p>
+          <a:p>
+            <a:pPr algn="l">
+              <a:lnSpc>
+                <a:spcPct val="150000"/>
+              </a:lnSpc>
+            </a:pPr>
+            <a:r>
+              <a:rPr lang="en" altLang="zh-CN" sz="1600" b="0" i="0" u="none" strike="noStrike" dirty="0">
+                <a:effectLst/>
+                <a:latin typeface="+mn-ea"/>
+              </a:rPr>
+              <a:t>MapReduce</a:t>
+            </a:r>
+            <a:r>
+              <a:rPr lang="zh-CN" altLang="en-US" sz="1600" b="0" i="0" u="none" strike="noStrike" dirty="0">
+                <a:effectLst/>
+                <a:latin typeface="+mn-ea"/>
+              </a:rPr>
+              <a:t>的中间结果必须写入磁盘，因为 </a:t>
+            </a:r>
+            <a:r>
+              <a:rPr lang="en" altLang="zh-CN" sz="1600" b="0" i="0" u="none" strike="noStrike" dirty="0">
+                <a:effectLst/>
+                <a:latin typeface="+mn-ea"/>
+              </a:rPr>
+              <a:t>mapper</a:t>
+            </a:r>
+            <a:r>
+              <a:rPr lang="zh-CN" altLang="en-US" sz="1600" b="0" i="0" u="none" strike="noStrike" dirty="0">
+                <a:effectLst/>
+                <a:latin typeface="+mn-ea"/>
+              </a:rPr>
+              <a:t>的输出需要通过标准输出（</a:t>
+            </a:r>
+            <a:r>
+              <a:rPr lang="en" altLang="zh-CN" sz="1600" b="0" i="0" u="none" strike="noStrike" dirty="0" err="1">
+                <a:effectLst/>
+                <a:latin typeface="+mn-ea"/>
+              </a:rPr>
+              <a:t>stdout</a:t>
+            </a:r>
+            <a:r>
+              <a:rPr lang="zh-CN" altLang="en" sz="1600" b="0" i="0" u="none" strike="noStrike" dirty="0">
+                <a:effectLst/>
+                <a:latin typeface="+mn-ea"/>
+              </a:rPr>
+              <a:t>）</a:t>
+            </a:r>
+            <a:r>
+              <a:rPr lang="zh-CN" altLang="en-US" sz="1600" b="0" i="0" u="none" strike="noStrike" dirty="0">
+                <a:effectLst/>
+                <a:latin typeface="+mn-ea"/>
+              </a:rPr>
+              <a:t>写出，而 </a:t>
+            </a:r>
+            <a:r>
+              <a:rPr lang="en" altLang="zh-CN" sz="1600" b="0" i="0" u="none" strike="noStrike" dirty="0">
+                <a:effectLst/>
+                <a:latin typeface="+mn-ea"/>
+              </a:rPr>
+              <a:t>reducer</a:t>
+            </a:r>
+            <a:r>
+              <a:rPr lang="zh-CN" altLang="en-US" sz="1600" b="0" i="0" u="none" strike="noStrike" dirty="0">
+                <a:effectLst/>
+                <a:latin typeface="+mn-ea"/>
+              </a:rPr>
+              <a:t>需要通过标准输入（</a:t>
+            </a:r>
+            <a:r>
+              <a:rPr lang="en" altLang="zh-CN" sz="1600" b="0" i="0" u="none" strike="noStrike" dirty="0">
+                <a:effectLst/>
+                <a:latin typeface="+mn-ea"/>
+              </a:rPr>
+              <a:t>stdin</a:t>
+            </a:r>
+            <a:r>
+              <a:rPr lang="zh-CN" altLang="en" sz="1600" b="0" i="0" u="none" strike="noStrike" dirty="0">
+                <a:effectLst/>
+                <a:latin typeface="+mn-ea"/>
+              </a:rPr>
+              <a:t>）</a:t>
+            </a:r>
+            <a:r>
+              <a:rPr lang="zh-CN" altLang="en-US" sz="1600" b="0" i="0" u="none" strike="noStrike" dirty="0">
+                <a:effectLst/>
+                <a:latin typeface="+mn-ea"/>
+              </a:rPr>
+              <a:t>读入。这种设计导致大量</a:t>
+            </a:r>
+            <a:r>
+              <a:rPr lang="en" altLang="zh-CN" sz="1600" b="0" i="0" u="none" strike="noStrike" dirty="0">
+                <a:effectLst/>
+                <a:latin typeface="+mn-ea"/>
+              </a:rPr>
+              <a:t>I/O</a:t>
+            </a:r>
+            <a:r>
+              <a:rPr lang="zh-CN" altLang="en-US" sz="1600" b="0" i="0" u="none" strike="noStrike" dirty="0">
+                <a:effectLst/>
+                <a:latin typeface="+mn-ea"/>
+              </a:rPr>
+              <a:t>操作，成为性能瓶颈。</a:t>
+            </a:r>
+            <a:endParaRPr lang="en-US" altLang="zh-CN" sz="1600" b="0" i="0" u="none" strike="noStrike" dirty="0">
+              <a:effectLst/>
+              <a:latin typeface="+mn-ea"/>
+            </a:endParaRPr>
+          </a:p>
+          <a:p>
+            <a:pPr algn="l">
+              <a:lnSpc>
+                <a:spcPct val="150000"/>
+              </a:lnSpc>
+            </a:pPr>
+            <a:endParaRPr lang="zh-CN" altLang="en-US" sz="1600" b="0" i="0" u="none" strike="noStrike" dirty="0">
+              <a:effectLst/>
+              <a:latin typeface="+mn-ea"/>
+            </a:endParaRPr>
+          </a:p>
+          <a:p>
+            <a:pPr algn="l">
+              <a:lnSpc>
+                <a:spcPct val="150000"/>
+              </a:lnSpc>
+            </a:pPr>
+            <a:r>
+              <a:rPr lang="en" altLang="zh-CN" sz="1600" b="1" i="0" u="none" strike="noStrike" dirty="0">
+                <a:effectLst/>
+                <a:latin typeface="+mn-ea"/>
+              </a:rPr>
+              <a:t>API</a:t>
+            </a:r>
+            <a:r>
+              <a:rPr lang="zh-CN" altLang="en-US" sz="1600" b="1" i="0" u="none" strike="noStrike" dirty="0">
+                <a:effectLst/>
+                <a:latin typeface="+mn-ea"/>
+              </a:rPr>
+              <a:t>表达力方面</a:t>
+            </a:r>
+            <a:r>
+              <a:rPr lang="en-US" altLang="zh-CN" sz="1600" b="1" i="0" u="none" strike="noStrike" dirty="0">
+                <a:effectLst/>
+                <a:latin typeface="+mn-ea"/>
+              </a:rPr>
+              <a:t>:</a:t>
+            </a:r>
+          </a:p>
+          <a:p>
+            <a:pPr algn="l">
+              <a:lnSpc>
+                <a:spcPct val="150000"/>
+              </a:lnSpc>
+            </a:pPr>
+            <a:r>
+              <a:rPr lang="en" altLang="zh-CN" sz="1600" b="0" i="0" u="none" strike="noStrike" dirty="0">
+                <a:effectLst/>
+                <a:latin typeface="+mn-ea"/>
+              </a:rPr>
+              <a:t>Spark</a:t>
+            </a:r>
+            <a:r>
+              <a:rPr lang="zh-CN" altLang="en-US" sz="1600" b="0" i="0" u="none" strike="noStrike" dirty="0">
+                <a:effectLst/>
+                <a:latin typeface="+mn-ea"/>
+              </a:rPr>
+              <a:t>提供了高级</a:t>
+            </a:r>
+            <a:r>
+              <a:rPr lang="en" altLang="zh-CN" sz="1600" b="0" i="0" u="none" strike="noStrike" dirty="0">
+                <a:effectLst/>
+                <a:latin typeface="+mn-ea"/>
+              </a:rPr>
+              <a:t>API</a:t>
+            </a:r>
+            <a:r>
+              <a:rPr lang="zh-CN" altLang="en-US" sz="1600" b="0" i="0" u="none" strike="noStrike" dirty="0">
+                <a:effectLst/>
+                <a:latin typeface="+mn-ea"/>
+              </a:rPr>
+              <a:t>如</a:t>
+            </a:r>
+            <a:r>
+              <a:rPr lang="en" altLang="zh-CN" sz="1600" b="0" i="0" u="none" strike="noStrike" dirty="0">
+                <a:effectLst/>
+                <a:latin typeface="+mn-ea"/>
+              </a:rPr>
+              <a:t>explode</a:t>
+            </a:r>
+            <a:r>
+              <a:rPr lang="zh-CN" altLang="en-US" sz="1600" dirty="0">
+                <a:latin typeface="+mn-ea"/>
+              </a:rPr>
+              <a:t>，</a:t>
+            </a:r>
+            <a:r>
+              <a:rPr lang="en" altLang="zh-CN" sz="1600" b="0" i="0" u="none" strike="noStrike" dirty="0" err="1">
+                <a:effectLst/>
+                <a:latin typeface="+mn-ea"/>
+              </a:rPr>
+              <a:t>groupBy</a:t>
+            </a:r>
+            <a:r>
+              <a:rPr lang="zh-CN" altLang="en-US" sz="1600" b="0" i="0" u="none" strike="noStrike" dirty="0">
+                <a:effectLst/>
+                <a:latin typeface="+mn-ea"/>
+              </a:rPr>
+              <a:t>，</a:t>
+            </a:r>
+            <a:r>
+              <a:rPr lang="en" altLang="zh-CN" sz="1600" b="0" i="0" u="none" strike="noStrike" dirty="0" err="1">
+                <a:effectLst/>
+                <a:latin typeface="+mn-ea"/>
+              </a:rPr>
+              <a:t>orderBy</a:t>
+            </a:r>
+            <a:r>
+              <a:rPr lang="zh-CN" altLang="en-US" sz="1600" b="0" i="0" u="none" strike="noStrike" dirty="0">
+                <a:effectLst/>
+                <a:latin typeface="+mn-ea"/>
+              </a:rPr>
+              <a:t>等</a:t>
+            </a:r>
+            <a:r>
+              <a:rPr lang="zh-CN" altLang="en-US" sz="1600" dirty="0">
+                <a:latin typeface="+mn-ea"/>
+              </a:rPr>
+              <a:t>，</a:t>
+            </a:r>
+            <a:r>
+              <a:rPr lang="zh-CN" altLang="en-US" sz="1600" b="0" i="0" u="none" strike="noStrike" dirty="0">
+                <a:effectLst/>
+                <a:latin typeface="+mn-ea"/>
+              </a:rPr>
+              <a:t>代码更简洁直观。</a:t>
+            </a:r>
+          </a:p>
+          <a:p>
+            <a:pPr algn="l">
+              <a:lnSpc>
+                <a:spcPct val="150000"/>
+              </a:lnSpc>
+            </a:pPr>
+            <a:r>
+              <a:rPr lang="en" altLang="zh-CN" sz="1600" b="0" i="0" u="none" strike="noStrike" dirty="0">
+                <a:effectLst/>
+                <a:latin typeface="+mn-ea"/>
+              </a:rPr>
+              <a:t>MapReduce</a:t>
+            </a:r>
+            <a:r>
+              <a:rPr lang="zh-CN" altLang="en-US" sz="1600" b="0" i="0" u="none" strike="noStrike" dirty="0">
+                <a:effectLst/>
+                <a:latin typeface="+mn-ea"/>
+              </a:rPr>
+              <a:t>需要手动实现排序、计数等逻辑</a:t>
+            </a:r>
+            <a:r>
+              <a:rPr lang="zh-CN" altLang="en-US" sz="1600" dirty="0">
+                <a:latin typeface="+mn-ea"/>
+              </a:rPr>
+              <a:t>，</a:t>
+            </a:r>
+            <a:r>
+              <a:rPr lang="zh-CN" altLang="en-US" sz="1600" b="0" i="0" u="none" strike="noStrike" dirty="0">
+                <a:effectLst/>
+                <a:latin typeface="+mn-ea"/>
+              </a:rPr>
+              <a:t>代码较为底层。</a:t>
+            </a:r>
+          </a:p>
+        </p:txBody>
+      </p:sp>
+    </p:spTree>
+    <p:extLst>
+      <p:ext uri="{BB962C8B-B14F-4D97-AF65-F5344CB8AC3E}">
+        <p14:creationId xmlns:p14="http://schemas.microsoft.com/office/powerpoint/2010/main" val="2065420427"/>
+      </p:ext>
+    </p:extLst>
+  </p:cSld>
+  <p:clrMapOvr>
+    <a:masterClrMapping/>
+  </p:clrMapOvr>
+</p:sld>
+</file>
+
+<file path=ppt/slides/slide17.xml><?xml version="1.0" encoding="utf-8"?>
+<p:sld xmlns:a="http://schemas.openxmlformats.org/drawingml/2006/main" xmlns:r="http://schemas.openxmlformats.org/officeDocument/2006/relationships" xmlns:p="http://schemas.openxmlformats.org/presentationml/2006/main">
+  <p:cSld>
+    <p:spTree>
+      <p:nvGrpSpPr>
+        <p:cNvPr id="1" name="">
+          <a:extLst>
+            <a:ext uri="{FF2B5EF4-FFF2-40B4-BE49-F238E27FC236}">
               <a16:creationId xmlns:a16="http://schemas.microsoft.com/office/drawing/2014/main" id="{4478B2EC-37FD-C069-6FD2-4E24375CA910}"/>
             </a:ext>
           </a:extLst>
@@ -12519,7 +13356,7 @@
           <a:p>
             <a:r>
               <a:rPr lang="zh-CN" altLang="en-US" dirty="0"/>
-              <a:t>实验结论</a:t>
+              <a:t>总结</a:t>
             </a:r>
           </a:p>
         </p:txBody>
@@ -12567,7 +13404,7 @@
 </p:sld>
 </file>
 
-<file path=ppt/slides/slide17.xml><?xml version="1.0" encoding="utf-8"?>
+<file path=ppt/slides/slide18.xml><?xml version="1.0" encoding="utf-8"?>
 <p:sld xmlns:a="http://schemas.openxmlformats.org/drawingml/2006/main" xmlns:r="http://schemas.openxmlformats.org/officeDocument/2006/relationships" xmlns:p="http://schemas.openxmlformats.org/presentationml/2006/main">
   <p:cSld>
     <p:spTree>

</xml_diff>